<commit_message>
Readme: Classes.png and used ` for variable names
</commit_message>
<xml_diff>
--- a/Design.pptx
+++ b/Design.pptx
@@ -296,7 +296,7 @@
           <a:p>
             <a:fld id="{B1A6C896-786E-40CB-ABF2-E7ECB1B703CB}" type="datetimeFigureOut">
               <a:rPr lang="en-SG" smtClean="0"/>
-              <a:t>14/6/2022</a:t>
+              <a:t>18/12/2023</a:t>
             </a:fld>
             <a:endParaRPr lang="en-SG"/>
           </a:p>
@@ -466,7 +466,7 @@
           <a:p>
             <a:fld id="{B1A6C896-786E-40CB-ABF2-E7ECB1B703CB}" type="datetimeFigureOut">
               <a:rPr lang="en-SG" smtClean="0"/>
-              <a:t>14/6/2022</a:t>
+              <a:t>18/12/2023</a:t>
             </a:fld>
             <a:endParaRPr lang="en-SG"/>
           </a:p>
@@ -646,7 +646,7 @@
           <a:p>
             <a:fld id="{B1A6C896-786E-40CB-ABF2-E7ECB1B703CB}" type="datetimeFigureOut">
               <a:rPr lang="en-SG" smtClean="0"/>
-              <a:t>14/6/2022</a:t>
+              <a:t>18/12/2023</a:t>
             </a:fld>
             <a:endParaRPr lang="en-SG"/>
           </a:p>
@@ -816,7 +816,7 @@
           <a:p>
             <a:fld id="{B1A6C896-786E-40CB-ABF2-E7ECB1B703CB}" type="datetimeFigureOut">
               <a:rPr lang="en-SG" smtClean="0"/>
-              <a:t>14/6/2022</a:t>
+              <a:t>18/12/2023</a:t>
             </a:fld>
             <a:endParaRPr lang="en-SG"/>
           </a:p>
@@ -1062,7 +1062,7 @@
           <a:p>
             <a:fld id="{B1A6C896-786E-40CB-ABF2-E7ECB1B703CB}" type="datetimeFigureOut">
               <a:rPr lang="en-SG" smtClean="0"/>
-              <a:t>14/6/2022</a:t>
+              <a:t>18/12/2023</a:t>
             </a:fld>
             <a:endParaRPr lang="en-SG"/>
           </a:p>
@@ -1350,7 +1350,7 @@
           <a:p>
             <a:fld id="{B1A6C896-786E-40CB-ABF2-E7ECB1B703CB}" type="datetimeFigureOut">
               <a:rPr lang="en-SG" smtClean="0"/>
-              <a:t>14/6/2022</a:t>
+              <a:t>18/12/2023</a:t>
             </a:fld>
             <a:endParaRPr lang="en-SG"/>
           </a:p>
@@ -1777,7 +1777,7 @@
           <a:p>
             <a:fld id="{B1A6C896-786E-40CB-ABF2-E7ECB1B703CB}" type="datetimeFigureOut">
               <a:rPr lang="en-SG" smtClean="0"/>
-              <a:t>14/6/2022</a:t>
+              <a:t>18/12/2023</a:t>
             </a:fld>
             <a:endParaRPr lang="en-SG"/>
           </a:p>
@@ -1895,7 +1895,7 @@
           <a:p>
             <a:fld id="{B1A6C896-786E-40CB-ABF2-E7ECB1B703CB}" type="datetimeFigureOut">
               <a:rPr lang="en-SG" smtClean="0"/>
-              <a:t>14/6/2022</a:t>
+              <a:t>18/12/2023</a:t>
             </a:fld>
             <a:endParaRPr lang="en-SG"/>
           </a:p>
@@ -1990,7 +1990,7 @@
           <a:p>
             <a:fld id="{B1A6C896-786E-40CB-ABF2-E7ECB1B703CB}" type="datetimeFigureOut">
               <a:rPr lang="en-SG" smtClean="0"/>
-              <a:t>14/6/2022</a:t>
+              <a:t>18/12/2023</a:t>
             </a:fld>
             <a:endParaRPr lang="en-SG"/>
           </a:p>
@@ -2267,7 +2267,7 @@
           <a:p>
             <a:fld id="{B1A6C896-786E-40CB-ABF2-E7ECB1B703CB}" type="datetimeFigureOut">
               <a:rPr lang="en-SG" smtClean="0"/>
-              <a:t>14/6/2022</a:t>
+              <a:t>18/12/2023</a:t>
             </a:fld>
             <a:endParaRPr lang="en-SG"/>
           </a:p>
@@ -2520,7 +2520,7 @@
           <a:p>
             <a:fld id="{B1A6C896-786E-40CB-ABF2-E7ECB1B703CB}" type="datetimeFigureOut">
               <a:rPr lang="en-SG" smtClean="0"/>
-              <a:t>14/6/2022</a:t>
+              <a:t>18/12/2023</a:t>
             </a:fld>
             <a:endParaRPr lang="en-SG"/>
           </a:p>
@@ -2733,7 +2733,7 @@
           <a:p>
             <a:fld id="{B1A6C896-786E-40CB-ABF2-E7ECB1B703CB}" type="datetimeFigureOut">
               <a:rPr lang="en-SG" smtClean="0"/>
-              <a:t>14/6/2022</a:t>
+              <a:t>18/12/2023</a:t>
             </a:fld>
             <a:endParaRPr lang="en-SG"/>
           </a:p>
@@ -3858,7 +3858,7 @@
         </p:nvSpPr>
         <p:spPr>
           <a:xfrm>
-            <a:off x="6336480" y="2484016"/>
+            <a:off x="6336480" y="2339950"/>
             <a:ext cx="1512168" cy="1080120"/>
           </a:xfrm>
           <a:prstGeom prst="rect">
@@ -3921,7 +3921,7 @@
         </p:nvSpPr>
         <p:spPr>
           <a:xfrm>
-            <a:off x="6336480" y="395784"/>
+            <a:off x="6336480" y="251660"/>
             <a:ext cx="1656184" cy="1728192"/>
           </a:xfrm>
           <a:prstGeom prst="rect">
@@ -4045,7 +4045,7 @@
         </p:nvSpPr>
         <p:spPr>
           <a:xfrm>
-            <a:off x="7488608" y="648923"/>
+            <a:off x="7488608" y="504799"/>
             <a:ext cx="144016" cy="1259029"/>
           </a:xfrm>
           <a:prstGeom prst="rightBrace">
@@ -4090,7 +4090,7 @@
         </p:nvSpPr>
         <p:spPr>
           <a:xfrm>
-            <a:off x="4368530" y="397901"/>
+            <a:off x="4368530" y="253777"/>
             <a:ext cx="1584176" cy="1080120"/>
           </a:xfrm>
           <a:prstGeom prst="rect">
@@ -4340,7 +4340,7 @@
           <a:prstGeom prst="straightConnector1">
             <a:avLst/>
           </a:prstGeom>
-          <a:ln>
+          <a:ln w="19050">
             <a:tailEnd type="arrow"/>
           </a:ln>
         </p:spPr>
@@ -4367,8 +4367,8 @@
         </p:nvCxnSpPr>
         <p:spPr>
           <a:xfrm flipV="1">
-            <a:off x="4860317" y="2629844"/>
-            <a:ext cx="1539336" cy="55540"/>
+            <a:off x="4860317" y="2481920"/>
+            <a:ext cx="1537698" cy="203464"/>
           </a:xfrm>
           <a:prstGeom prst="straightConnector1">
             <a:avLst/>
@@ -4400,7 +4400,7 @@
         </p:nvCxnSpPr>
         <p:spPr>
           <a:xfrm flipV="1">
-            <a:off x="5736682" y="553503"/>
+            <a:off x="5736682" y="409379"/>
             <a:ext cx="671806" cy="552547"/>
           </a:xfrm>
           <a:prstGeom prst="straightConnector1">
@@ -4434,7 +4434,7 @@
         <p:spPr>
           <a:xfrm flipH="1" flipV="1">
             <a:off x="4968329" y="2481920"/>
-            <a:ext cx="1429686" cy="337194"/>
+            <a:ext cx="1429686" cy="168597"/>
           </a:xfrm>
           <a:prstGeom prst="straightConnector1">
             <a:avLst/>
@@ -4668,13 +4668,13 @@
         </p:nvCxnSpPr>
         <p:spPr>
           <a:xfrm flipV="1">
-            <a:off x="7234773" y="2827339"/>
-            <a:ext cx="1261948" cy="160605"/>
+            <a:off x="7234773" y="2827340"/>
+            <a:ext cx="1261948" cy="52670"/>
           </a:xfrm>
           <a:prstGeom prst="straightConnector1">
             <a:avLst/>
           </a:prstGeom>
-          <a:ln>
+          <a:ln w="19050">
             <a:tailEnd type="arrow"/>
           </a:ln>
         </p:spPr>
@@ -4737,7 +4737,7 @@
         </p:nvCxnSpPr>
         <p:spPr>
           <a:xfrm flipH="1" flipV="1">
-            <a:off x="6831701" y="2629844"/>
+            <a:off x="6760823" y="2479882"/>
             <a:ext cx="1665020" cy="1677477"/>
           </a:xfrm>
           <a:prstGeom prst="straightConnector1">
@@ -4779,7 +4779,7 @@
           <a:prstGeom prst="straightConnector1">
             <a:avLst/>
           </a:prstGeom>
-          <a:ln>
+          <a:ln w="19050">
             <a:tailEnd type="arrow"/>
           </a:ln>
         </p:spPr>
@@ -4854,8 +4854,8 @@
         </p:nvCxnSpPr>
         <p:spPr>
           <a:xfrm>
-            <a:off x="7632624" y="1278438"/>
-            <a:ext cx="793219" cy="2282247"/>
+            <a:off x="7632624" y="1134314"/>
+            <a:ext cx="793219" cy="2426371"/>
           </a:xfrm>
           <a:prstGeom prst="straightConnector1">
             <a:avLst/>
@@ -4895,14 +4895,14 @@
           <p:nvPr>
             <p:extLst>
               <p:ext uri="{D42A27DB-BD31-4B8C-83A1-F6EECF244321}">
-                <p14:modId xmlns:p14="http://schemas.microsoft.com/office/powerpoint/2010/main" val="461668478"/>
+                <p14:modId xmlns:p14="http://schemas.microsoft.com/office/powerpoint/2010/main" val="382366790"/>
               </p:ext>
             </p:extLst>
           </p:nvPr>
         </p:nvGraphicFramePr>
         <p:xfrm>
           <a:off x="1512226" y="5436344"/>
-          <a:ext cx="8496663" cy="1920240"/>
+          <a:ext cx="8496663" cy="2103120"/>
         </p:xfrm>
         <a:graphic>
           <a:graphicData uri="http://schemas.openxmlformats.org/drawingml/2006/table">
@@ -4984,7 +4984,7 @@
                     <a:bodyPr/>
                     <a:lstStyle/>
                     <a:p>
-                      <a:endParaRPr lang="en-SG" sz="1200"/>
+                      <a:endParaRPr lang="en-SG" sz="1200" dirty="0"/>
                     </a:p>
                   </a:txBody>
                   <a:tcPr/>
@@ -4996,7 +4996,17 @@
                     <a:p>
                       <a:r>
                         <a:rPr lang="en-SG" sz="1200" dirty="0" smtClean="0"/>
-                        <a:t>Forward link from parent to child</a:t>
+                        <a:t>Forward link from parent to </a:t>
+                      </a:r>
+                      <a:r>
+                        <a:rPr lang="en-SG" sz="1200" dirty="0" smtClean="0"/>
+                        <a:t>1 child</a:t>
+                      </a:r>
+                    </a:p>
+                    <a:p>
+                      <a:r>
+                        <a:rPr lang="en-SG" sz="1200" dirty="0" smtClean="0"/>
+                        <a:t>Forward link from parent to many children</a:t>
                       </a:r>
                       <a:endParaRPr lang="en-SG" sz="1200" dirty="0"/>
                     </a:p>
@@ -5052,7 +5062,15 @@
                       </a:r>
                       <a:r>
                         <a:rPr lang="en-SG" sz="1200" baseline="0" dirty="0" smtClean="0"/>
-                        <a:t> once, when a new Game starts</a:t>
+                        <a:t> </a:t>
+                      </a:r>
+                      <a:r>
+                        <a:rPr lang="en-SG" sz="1200" baseline="0" dirty="0" smtClean="0"/>
+                        <a:t>once </a:t>
+                      </a:r>
+                      <a:r>
+                        <a:rPr lang="en-SG" sz="1200" baseline="0" dirty="0" smtClean="0"/>
+                        <a:t>when a new Game starts</a:t>
                       </a:r>
                       <a:endParaRPr lang="en-SG" sz="1200" dirty="0"/>
                     </a:p>
@@ -5187,7 +5205,7 @@
         </p:nvCxnSpPr>
         <p:spPr>
           <a:xfrm flipH="1">
-            <a:off x="1649180" y="6948512"/>
+            <a:off x="1649180" y="7132370"/>
             <a:ext cx="1212550" cy="0"/>
           </a:xfrm>
           <a:prstGeom prst="straightConnector1">
@@ -5223,7 +5241,7 @@
         </p:nvCxnSpPr>
         <p:spPr>
           <a:xfrm>
-            <a:off x="1673057" y="7236544"/>
+            <a:off x="1673057" y="7420402"/>
             <a:ext cx="1200258" cy="0"/>
           </a:xfrm>
           <a:prstGeom prst="straightConnector1">
@@ -5263,7 +5281,7 @@
         </p:nvSpPr>
         <p:spPr>
           <a:xfrm>
-            <a:off x="1727969" y="458083"/>
+            <a:off x="1727969" y="313959"/>
             <a:ext cx="1800200" cy="1080120"/>
           </a:xfrm>
           <a:prstGeom prst="rect">
@@ -5399,7 +5417,7 @@
         </p:nvSpPr>
         <p:spPr>
           <a:xfrm>
-            <a:off x="3384153" y="725601"/>
+            <a:off x="3384153" y="581477"/>
             <a:ext cx="144016" cy="682965"/>
           </a:xfrm>
           <a:prstGeom prst="rightBrace">
@@ -5447,8 +5465,8 @@
         </p:nvCxnSpPr>
         <p:spPr>
           <a:xfrm>
-            <a:off x="3528169" y="1067084"/>
-            <a:ext cx="936104" cy="2428992"/>
+            <a:off x="3528169" y="922960"/>
+            <a:ext cx="936104" cy="2573116"/>
           </a:xfrm>
           <a:prstGeom prst="straightConnector1">
             <a:avLst/>
@@ -5487,7 +5505,7 @@
         </p:nvCxnSpPr>
         <p:spPr>
           <a:xfrm flipH="1" flipV="1">
-            <a:off x="2448049" y="597954"/>
+            <a:off x="2448049" y="453830"/>
             <a:ext cx="1992490" cy="125100"/>
           </a:xfrm>
           <a:prstGeom prst="straightConnector1">
@@ -5601,6 +5619,392 @@
           </a:p>
         </p:txBody>
       </p:sp>
+      <p:sp>
+        <p:nvSpPr>
+          <p:cNvPr id="33" name="TextBox 32"/>
+          <p:cNvSpPr txBox="1"/>
+          <p:nvPr/>
+        </p:nvSpPr>
+        <p:spPr>
+          <a:xfrm>
+            <a:off x="1943993" y="1691860"/>
+            <a:ext cx="1512168" cy="1239310"/>
+          </a:xfrm>
+          <a:prstGeom prst="rect">
+            <a:avLst/>
+          </a:prstGeom>
+          <a:ln>
+            <a:noFill/>
+          </a:ln>
+        </p:spPr>
+        <p:style>
+          <a:lnRef idx="1">
+            <a:schemeClr val="accent3"/>
+          </a:lnRef>
+          <a:fillRef idx="2">
+            <a:schemeClr val="accent3"/>
+          </a:fillRef>
+          <a:effectRef idx="1">
+            <a:schemeClr val="accent3"/>
+          </a:effectRef>
+          <a:fontRef idx="minor">
+            <a:schemeClr val="dk1"/>
+          </a:fontRef>
+        </p:style>
+        <p:txBody>
+          <a:bodyPr wrap="square" rtlCol="0">
+            <a:noAutofit/>
+          </a:bodyPr>
+          <a:lstStyle/>
+          <a:p>
+            <a:r>
+              <a:rPr lang="en-SG" sz="1200" b="1" dirty="0" smtClean="0">
+                <a:latin typeface="Consolas" panose="020B0609020204030204" pitchFamily="49" charset="0"/>
+              </a:rPr>
+              <a:t>Robot</a:t>
+            </a:r>
+            <a:endParaRPr lang="en-SG" sz="1200" b="1" dirty="0" smtClean="0">
+              <a:latin typeface="Consolas" panose="020B0609020204030204" pitchFamily="49" charset="0"/>
+            </a:endParaRPr>
+          </a:p>
+          <a:p>
+            <a:r>
+              <a:rPr lang="en-SG" sz="1200" dirty="0" smtClean="0">
+                <a:latin typeface="Consolas" panose="020B0609020204030204" pitchFamily="49" charset="0"/>
+              </a:rPr>
+              <a:t>Map</a:t>
+            </a:r>
+            <a:endParaRPr lang="en-SG" sz="1200" dirty="0">
+              <a:latin typeface="Consolas" panose="020B0609020204030204" pitchFamily="49" charset="0"/>
+            </a:endParaRPr>
+          </a:p>
+          <a:p>
+            <a:r>
+              <a:rPr lang="en-SG" sz="1200" dirty="0" smtClean="0"/>
+              <a:t>Game</a:t>
+            </a:r>
+          </a:p>
+          <a:p>
+            <a:r>
+              <a:rPr lang="en-SG" sz="1200" dirty="0" smtClean="0"/>
+              <a:t>Player</a:t>
+            </a:r>
+            <a:endParaRPr lang="en-SG" sz="1200" dirty="0" smtClean="0">
+              <a:latin typeface="Consolas" panose="020B0609020204030204" pitchFamily="49" charset="0"/>
+            </a:endParaRPr>
+          </a:p>
+          <a:p>
+            <a:r>
+              <a:rPr lang="en-SG" sz="1200" dirty="0" err="1"/>
+              <a:t>RobotCountryIds</a:t>
+            </a:r>
+            <a:endParaRPr lang="en-SG" sz="1200" dirty="0" smtClean="0">
+              <a:latin typeface="Consolas" panose="020B0609020204030204" pitchFamily="49" charset="0"/>
+            </a:endParaRPr>
+          </a:p>
+          <a:p>
+            <a:r>
+              <a:rPr lang="en-SG" sz="1200" dirty="0" smtClean="0"/>
+              <a:t>Results</a:t>
+            </a:r>
+            <a:endParaRPr lang="en-SG" sz="1200" dirty="0">
+              <a:latin typeface="Consolas" panose="020B0609020204030204" pitchFamily="49" charset="0"/>
+            </a:endParaRPr>
+          </a:p>
+        </p:txBody>
+      </p:sp>
+      <p:cxnSp>
+        <p:nvCxnSpPr>
+          <p:cNvPr id="34" name="Straight Arrow Connector 33"/>
+          <p:cNvCxnSpPr/>
+          <p:nvPr/>
+        </p:nvCxnSpPr>
+        <p:spPr>
+          <a:xfrm>
+            <a:off x="2375917" y="1979852"/>
+            <a:ext cx="3960563" cy="360098"/>
+          </a:xfrm>
+          <a:prstGeom prst="straightConnector1">
+            <a:avLst/>
+          </a:prstGeom>
+          <a:ln>
+            <a:tailEnd type="arrow"/>
+          </a:ln>
+        </p:spPr>
+        <p:style>
+          <a:lnRef idx="1">
+            <a:schemeClr val="accent1"/>
+          </a:lnRef>
+          <a:fillRef idx="0">
+            <a:schemeClr val="accent1"/>
+          </a:fillRef>
+          <a:effectRef idx="0">
+            <a:schemeClr val="accent1"/>
+          </a:effectRef>
+          <a:fontRef idx="minor">
+            <a:schemeClr val="tx1"/>
+          </a:fontRef>
+        </p:style>
+      </p:cxnSp>
+      <p:cxnSp>
+        <p:nvCxnSpPr>
+          <p:cNvPr id="42" name="Straight Arrow Connector 41"/>
+          <p:cNvCxnSpPr/>
+          <p:nvPr/>
+        </p:nvCxnSpPr>
+        <p:spPr>
+          <a:xfrm>
+            <a:off x="2448049" y="2209518"/>
+            <a:ext cx="2016224" cy="274452"/>
+          </a:xfrm>
+          <a:prstGeom prst="straightConnector1">
+            <a:avLst/>
+          </a:prstGeom>
+          <a:ln>
+            <a:tailEnd type="arrow"/>
+          </a:ln>
+        </p:spPr>
+        <p:style>
+          <a:lnRef idx="1">
+            <a:schemeClr val="accent1"/>
+          </a:lnRef>
+          <a:fillRef idx="0">
+            <a:schemeClr val="accent1"/>
+          </a:fillRef>
+          <a:effectRef idx="0">
+            <a:schemeClr val="accent1"/>
+          </a:effectRef>
+          <a:fontRef idx="minor">
+            <a:schemeClr val="tx1"/>
+          </a:fontRef>
+        </p:style>
+      </p:cxnSp>
+      <p:sp>
+        <p:nvSpPr>
+          <p:cNvPr id="21" name="Freeform 20"/>
+          <p:cNvSpPr/>
+          <p:nvPr/>
+        </p:nvSpPr>
+        <p:spPr>
+          <a:xfrm>
+            <a:off x="2492734" y="2370061"/>
+            <a:ext cx="3820602" cy="2027010"/>
+          </a:xfrm>
+          <a:custGeom>
+            <a:avLst/>
+            <a:gdLst>
+              <a:gd name="connsiteX0" fmla="*/ 0 w 3820602"/>
+              <a:gd name="connsiteY0" fmla="*/ 15330 h 2027010"/>
+              <a:gd name="connsiteX1" fmla="*/ 1264257 w 3820602"/>
+              <a:gd name="connsiteY1" fmla="*/ 241942 h 2027010"/>
+              <a:gd name="connsiteX2" fmla="*/ 1614115 w 3820602"/>
+              <a:gd name="connsiteY2" fmla="*/ 1689080 h 2027010"/>
+              <a:gd name="connsiteX3" fmla="*/ 3820602 w 3820602"/>
+              <a:gd name="connsiteY3" fmla="*/ 2027010 h 2027010"/>
+              <a:gd name="connsiteX4" fmla="*/ 3820602 w 3820602"/>
+              <a:gd name="connsiteY4" fmla="*/ 2027010 h 2027010"/>
+            </a:gdLst>
+            <a:ahLst/>
+            <a:cxnLst>
+              <a:cxn ang="0">
+                <a:pos x="connsiteX0" y="connsiteY0"/>
+              </a:cxn>
+              <a:cxn ang="0">
+                <a:pos x="connsiteX1" y="connsiteY1"/>
+              </a:cxn>
+              <a:cxn ang="0">
+                <a:pos x="connsiteX2" y="connsiteY2"/>
+              </a:cxn>
+              <a:cxn ang="0">
+                <a:pos x="connsiteX3" y="connsiteY3"/>
+              </a:cxn>
+              <a:cxn ang="0">
+                <a:pos x="connsiteX4" y="connsiteY4"/>
+              </a:cxn>
+            </a:cxnLst>
+            <a:rect l="l" t="t" r="r" b="b"/>
+            <a:pathLst>
+              <a:path w="3820602" h="2027010">
+                <a:moveTo>
+                  <a:pt x="0" y="15330"/>
+                </a:moveTo>
+                <a:cubicBezTo>
+                  <a:pt x="497619" y="-10843"/>
+                  <a:pt x="995238" y="-37016"/>
+                  <a:pt x="1264257" y="241942"/>
+                </a:cubicBezTo>
+                <a:cubicBezTo>
+                  <a:pt x="1533276" y="520900"/>
+                  <a:pt x="1188058" y="1391569"/>
+                  <a:pt x="1614115" y="1689080"/>
+                </a:cubicBezTo>
+                <a:cubicBezTo>
+                  <a:pt x="2040172" y="1986591"/>
+                  <a:pt x="3820602" y="2027010"/>
+                  <a:pt x="3820602" y="2027010"/>
+                </a:cubicBezTo>
+                <a:lnTo>
+                  <a:pt x="3820602" y="2027010"/>
+                </a:lnTo>
+              </a:path>
+            </a:pathLst>
+          </a:custGeom>
+          <a:noFill/>
+          <a:ln w="9525">
+            <a:solidFill>
+              <a:schemeClr val="accent1"/>
+            </a:solidFill>
+            <a:headEnd type="none" w="med" len="med"/>
+            <a:tailEnd type="arrow" w="med" len="med"/>
+          </a:ln>
+        </p:spPr>
+        <p:style>
+          <a:lnRef idx="2">
+            <a:schemeClr val="accent1">
+              <a:shade val="50000"/>
+            </a:schemeClr>
+          </a:lnRef>
+          <a:fillRef idx="1">
+            <a:schemeClr val="accent1"/>
+          </a:fillRef>
+          <a:effectRef idx="0">
+            <a:schemeClr val="accent1"/>
+          </a:effectRef>
+          <a:fontRef idx="minor">
+            <a:schemeClr val="lt1"/>
+          </a:fontRef>
+        </p:style>
+        <p:txBody>
+          <a:bodyPr rtlCol="0" anchor="ctr"/>
+          <a:lstStyle/>
+          <a:p>
+            <a:pPr algn="ctr"/>
+            <a:endParaRPr lang="en-SG"/>
+          </a:p>
+        </p:txBody>
+      </p:sp>
+      <p:sp>
+        <p:nvSpPr>
+          <p:cNvPr id="22" name="Freeform 21"/>
+          <p:cNvSpPr/>
+          <p:nvPr/>
+        </p:nvSpPr>
+        <p:spPr>
+          <a:xfrm>
+            <a:off x="3168027" y="2650517"/>
+            <a:ext cx="5160964" cy="2507717"/>
+          </a:xfrm>
+          <a:custGeom>
+            <a:avLst/>
+            <a:gdLst>
+              <a:gd name="connsiteX0" fmla="*/ 0 w 5709036"/>
+              <a:gd name="connsiteY0" fmla="*/ 0 h 2407083"/>
+              <a:gd name="connsiteX1" fmla="*/ 1288111 w 5709036"/>
+              <a:gd name="connsiteY1" fmla="*/ 2142877 h 2407083"/>
+              <a:gd name="connsiteX2" fmla="*/ 5709036 w 5709036"/>
+              <a:gd name="connsiteY2" fmla="*/ 2297927 h 2407083"/>
+            </a:gdLst>
+            <a:ahLst/>
+            <a:cxnLst>
+              <a:cxn ang="0">
+                <a:pos x="connsiteX0" y="connsiteY0"/>
+              </a:cxn>
+              <a:cxn ang="0">
+                <a:pos x="connsiteX1" y="connsiteY1"/>
+              </a:cxn>
+              <a:cxn ang="0">
+                <a:pos x="connsiteX2" y="connsiteY2"/>
+              </a:cxn>
+            </a:cxnLst>
+            <a:rect l="l" t="t" r="r" b="b"/>
+            <a:pathLst>
+              <a:path w="5709036" h="2407083">
+                <a:moveTo>
+                  <a:pt x="0" y="0"/>
+                </a:moveTo>
+                <a:cubicBezTo>
+                  <a:pt x="168302" y="879944"/>
+                  <a:pt x="336605" y="1759889"/>
+                  <a:pt x="1288111" y="2142877"/>
+                </a:cubicBezTo>
+                <a:cubicBezTo>
+                  <a:pt x="2239617" y="2525865"/>
+                  <a:pt x="3974326" y="2411896"/>
+                  <a:pt x="5709036" y="2297927"/>
+                </a:cubicBezTo>
+              </a:path>
+            </a:pathLst>
+          </a:custGeom>
+          <a:noFill/>
+          <a:ln w="19050">
+            <a:solidFill>
+              <a:schemeClr val="accent1"/>
+            </a:solidFill>
+            <a:headEnd type="none" w="med" len="med"/>
+            <a:tailEnd type="arrow" w="med" len="med"/>
+          </a:ln>
+        </p:spPr>
+        <p:style>
+          <a:lnRef idx="2">
+            <a:schemeClr val="accent1">
+              <a:shade val="50000"/>
+            </a:schemeClr>
+          </a:lnRef>
+          <a:fillRef idx="1">
+            <a:schemeClr val="accent1"/>
+          </a:fillRef>
+          <a:effectRef idx="0">
+            <a:schemeClr val="accent1"/>
+          </a:effectRef>
+          <a:fontRef idx="minor">
+            <a:schemeClr val="lt1"/>
+          </a:fontRef>
+        </p:style>
+        <p:txBody>
+          <a:bodyPr rtlCol="0" anchor="ctr"/>
+          <a:lstStyle/>
+          <a:p>
+            <a:pPr algn="ctr"/>
+            <a:endParaRPr lang="en-SG"/>
+          </a:p>
+        </p:txBody>
+      </p:sp>
+      <p:cxnSp>
+        <p:nvCxnSpPr>
+          <p:cNvPr id="49" name="Straight Arrow Connector 48"/>
+          <p:cNvCxnSpPr/>
+          <p:nvPr/>
+        </p:nvCxnSpPr>
+        <p:spPr>
+          <a:xfrm>
+            <a:off x="1670909" y="6848664"/>
+            <a:ext cx="1209078" cy="0"/>
+          </a:xfrm>
+          <a:prstGeom prst="straightConnector1">
+            <a:avLst/>
+          </a:prstGeom>
+          <a:ln w="19050">
+            <a:solidFill>
+              <a:schemeClr val="accent1"/>
+            </a:solidFill>
+            <a:tailEnd type="arrow"/>
+          </a:ln>
+        </p:spPr>
+        <p:style>
+          <a:lnRef idx="1">
+            <a:schemeClr val="accent1"/>
+          </a:lnRef>
+          <a:fillRef idx="0">
+            <a:schemeClr val="accent1"/>
+          </a:fillRef>
+          <a:effectRef idx="0">
+            <a:schemeClr val="accent1"/>
+          </a:effectRef>
+          <a:fontRef idx="minor">
+            <a:schemeClr val="tx1"/>
+          </a:fontRef>
+        </p:style>
+      </p:cxnSp>
     </p:spTree>
     <p:extLst>
       <p:ext uri="{BB962C8B-B14F-4D97-AF65-F5344CB8AC3E}">

</xml_diff>